<commit_message>
First draft now finished. Polish needed.
</commit_message>
<xml_diff>
--- a/crypto.pptx
+++ b/crypto.pptx
@@ -13,8 +13,7 @@
     <p:sldId id="260" r:id="rId7"/>
     <p:sldId id="262" r:id="rId8"/>
     <p:sldId id="261" r:id="rId9"/>
-    <p:sldId id="267" r:id="rId10"/>
-    <p:sldId id="266" r:id="rId11"/>
+    <p:sldId id="266" r:id="rId10"/>
   </p:sldIdLst>
   <p:sldSz cx="12192000" cy="6858000"/>
   <p:notesSz cx="6858000" cy="9144000"/>
@@ -3466,116 +3465,6 @@
 </p:sld>
 </file>
 
-<file path=ppt/slides/slide10.xml><?xml version="1.0" encoding="utf-8"?>
-<p:sld xmlns:a="http://schemas.openxmlformats.org/drawingml/2006/main" xmlns:r="http://schemas.openxmlformats.org/officeDocument/2006/relationships" xmlns:p="http://schemas.openxmlformats.org/presentationml/2006/main">
-  <p:cSld>
-    <p:spTree>
-      <p:nvGrpSpPr>
-        <p:cNvPr id="1" name=""/>
-        <p:cNvGrpSpPr/>
-        <p:nvPr/>
-      </p:nvGrpSpPr>
-      <p:grpSpPr>
-        <a:xfrm>
-          <a:off x="0" y="0"/>
-          <a:ext cx="0" cy="0"/>
-          <a:chOff x="0" y="0"/>
-          <a:chExt cx="0" cy="0"/>
-        </a:xfrm>
-      </p:grpSpPr>
-      <p:sp>
-        <p:nvSpPr>
-          <p:cNvPr id="2" name="Title 1">
-            <a:extLst>
-              <a:ext uri="{FF2B5EF4-FFF2-40B4-BE49-F238E27FC236}">
-                <a16:creationId xmlns:a16="http://schemas.microsoft.com/office/drawing/2014/main" id="{7A65BAD6-74B9-4EA0-B53E-59FF7A662FA7}"/>
-              </a:ext>
-            </a:extLst>
-          </p:cNvPr>
-          <p:cNvSpPr>
-            <a:spLocks noGrp="1"/>
-          </p:cNvSpPr>
-          <p:nvPr>
-            <p:ph type="title"/>
-          </p:nvPr>
-        </p:nvSpPr>
-        <p:spPr/>
-        <p:txBody>
-          <a:bodyPr/>
-          <a:lstStyle/>
-          <a:p>
-            <a:r>
-              <a:rPr lang="en-GB" dirty="0"/>
-              <a:t>Further reading / recommended links</a:t>
-            </a:r>
-          </a:p>
-        </p:txBody>
-      </p:sp>
-      <p:sp>
-        <p:nvSpPr>
-          <p:cNvPr id="3" name="Content Placeholder 2">
-            <a:extLst>
-              <a:ext uri="{FF2B5EF4-FFF2-40B4-BE49-F238E27FC236}">
-                <a16:creationId xmlns:a16="http://schemas.microsoft.com/office/drawing/2014/main" id="{8C533110-7348-4381-90B0-94B4E575E502}"/>
-              </a:ext>
-            </a:extLst>
-          </p:cNvPr>
-          <p:cNvSpPr>
-            <a:spLocks noGrp="1"/>
-          </p:cNvSpPr>
-          <p:nvPr>
-            <p:ph idx="1"/>
-          </p:nvPr>
-        </p:nvSpPr>
-        <p:spPr/>
-        <p:txBody>
-          <a:bodyPr/>
-          <a:lstStyle/>
-          <a:p>
-            <a:r>
-              <a:rPr lang="en-GB" dirty="0"/>
-              <a:t>3blue1brown “</a:t>
-            </a:r>
-            <a:r>
-              <a:rPr lang="en-US" dirty="0"/>
-              <a:t>Ever wonder how Bitcoin (and other cryptocurrencies) actually work?</a:t>
-            </a:r>
-            <a:r>
-              <a:rPr lang="en-GB" dirty="0"/>
-              <a:t>” - </a:t>
-            </a:r>
-            <a:r>
-              <a:rPr lang="en-GB" dirty="0">
-                <a:hlinkClick r:id="rId2"/>
-              </a:rPr>
-              <a:t>https://www.youtube.com/watch?v=bBC-nXj3Ng4</a:t>
-            </a:r>
-            <a:endParaRPr lang="en-GB" dirty="0"/>
-          </a:p>
-          <a:p>
-            <a:r>
-              <a:rPr lang="en-GB" dirty="0"/>
-              <a:t>Somewhere to view the current latest block - https://blockexplorer.com/</a:t>
-            </a:r>
-          </a:p>
-          <a:p>
-            <a:endParaRPr lang="en-GB" dirty="0"/>
-          </a:p>
-        </p:txBody>
-      </p:sp>
-    </p:spTree>
-    <p:extLst>
-      <p:ext uri="{BB962C8B-B14F-4D97-AF65-F5344CB8AC3E}">
-        <p14:creationId xmlns:p14="http://schemas.microsoft.com/office/powerpoint/2010/main" val="2043931488"/>
-      </p:ext>
-    </p:extLst>
-  </p:cSld>
-  <p:clrMapOvr>
-    <a:masterClrMapping/>
-  </p:clrMapOvr>
-</p:sld>
-</file>
-
 <file path=ppt/slides/slide2.xml><?xml version="1.0" encoding="utf-8"?>
 <p:sld xmlns:a="http://schemas.openxmlformats.org/drawingml/2006/main" xmlns:r="http://schemas.openxmlformats.org/officeDocument/2006/relationships" xmlns:p="http://schemas.openxmlformats.org/presentationml/2006/main">
   <p:cSld>
@@ -4117,16 +4006,23 @@
             <p:ph idx="1"/>
           </p:nvPr>
         </p:nvSpPr>
-        <p:spPr/>
-        <p:txBody>
-          <a:bodyPr/>
+        <p:spPr>
+          <a:xfrm>
+            <a:off x="838199" y="1825625"/>
+            <a:ext cx="11103591" cy="4351338"/>
+          </a:xfrm>
+        </p:spPr>
+        <p:txBody>
+          <a:bodyPr>
+            <a:normAutofit fontScale="92500"/>
+          </a:bodyPr>
           <a:lstStyle/>
           <a:p>
             <a:pPr marL="0" indent="0">
               <a:buNone/>
             </a:pPr>
             <a:r>
-              <a:rPr lang="en-GB" dirty="0"/>
+              <a:rPr lang="en-GB" sz="3500" dirty="0"/>
               <a:t>(1) All transactions to be immutable</a:t>
             </a:r>
           </a:p>
@@ -4135,7 +4031,7 @@
               <a:buNone/>
             </a:pPr>
             <a:r>
-              <a:rPr lang="en-GB" dirty="0"/>
+              <a:rPr lang="en-GB" sz="3500" dirty="0"/>
               <a:t>(2) Everyone to agree on a single ledger</a:t>
             </a:r>
           </a:p>
@@ -4144,7 +4040,7 @@
               <a:buNone/>
             </a:pPr>
             <a:r>
-              <a:rPr lang="en-GB" dirty="0"/>
+              <a:rPr lang="en-GB" sz="3500" dirty="0"/>
               <a:t>(3) A way to add initial funds to the ledger</a:t>
             </a:r>
           </a:p>
@@ -4153,8 +4049,41 @@
               <a:buNone/>
             </a:pPr>
             <a:r>
-              <a:rPr lang="en-GB" dirty="0"/>
-              <a:t>(4) Be able to confirm the identity of participants to the ledger</a:t>
+              <a:rPr lang="en-GB" sz="3500" dirty="0"/>
+              <a:t>(4) Be able to confirm the identity of participants to the ledger*</a:t>
+            </a:r>
+          </a:p>
+          <a:p>
+            <a:pPr marL="0" indent="0">
+              <a:buNone/>
+            </a:pPr>
+            <a:endParaRPr lang="en-GB" dirty="0"/>
+          </a:p>
+          <a:p>
+            <a:pPr marL="0" indent="0">
+              <a:buNone/>
+            </a:pPr>
+            <a:endParaRPr lang="en-GB" dirty="0"/>
+          </a:p>
+          <a:p>
+            <a:pPr marL="0" indent="0">
+              <a:buNone/>
+            </a:pPr>
+            <a:endParaRPr lang="en-GB" sz="1500" dirty="0"/>
+          </a:p>
+          <a:p>
+            <a:pPr marL="0" indent="0">
+              <a:buNone/>
+            </a:pPr>
+            <a:endParaRPr lang="en-GB" sz="1500" dirty="0"/>
+          </a:p>
+          <a:p>
+            <a:pPr marL="0" indent="0">
+              <a:buNone/>
+            </a:pPr>
+            <a:r>
+              <a:rPr lang="en-GB" sz="1500" dirty="0"/>
+              <a:t>*this is done through public / private keys</a:t>
             </a:r>
           </a:p>
         </p:txBody>
@@ -4513,7 +4442,7 @@
           <p:cNvPr id="2" name="Title 1">
             <a:extLst>
               <a:ext uri="{FF2B5EF4-FFF2-40B4-BE49-F238E27FC236}">
-                <a16:creationId xmlns:a16="http://schemas.microsoft.com/office/drawing/2014/main" id="{999ACBEE-7DFC-401B-A68D-B094AB62921C}"/>
+                <a16:creationId xmlns:a16="http://schemas.microsoft.com/office/drawing/2014/main" id="{7A65BAD6-74B9-4EA0-B53E-59FF7A662FA7}"/>
               </a:ext>
             </a:extLst>
           </p:cNvPr>
@@ -4531,7 +4460,7 @@
           <a:p>
             <a:r>
               <a:rPr lang="en-GB" dirty="0"/>
-              <a:t>(4) Public / private keys</a:t>
+              <a:t>Links!</a:t>
             </a:r>
           </a:p>
         </p:txBody>
@@ -4541,7 +4470,7 @@
           <p:cNvPr id="3" name="Content Placeholder 2">
             <a:extLst>
               <a:ext uri="{FF2B5EF4-FFF2-40B4-BE49-F238E27FC236}">
-                <a16:creationId xmlns:a16="http://schemas.microsoft.com/office/drawing/2014/main" id="{BF2B507F-750E-4A6F-9A3E-CD9A49AA8BEB}"/>
+                <a16:creationId xmlns:a16="http://schemas.microsoft.com/office/drawing/2014/main" id="{8C533110-7348-4381-90B0-94B4E575E502}"/>
               </a:ext>
             </a:extLst>
           </p:cNvPr>
@@ -4556,6 +4485,33 @@
         <p:txBody>
           <a:bodyPr/>
           <a:lstStyle/>
+          <a:p>
+            <a:r>
+              <a:rPr lang="en-GB" dirty="0"/>
+              <a:t>3blue1brown “</a:t>
+            </a:r>
+            <a:r>
+              <a:rPr lang="en-US" dirty="0"/>
+              <a:t>Ever wonder how Bitcoin (and other cryptocurrencies) actually work?</a:t>
+            </a:r>
+            <a:r>
+              <a:rPr lang="en-GB" dirty="0"/>
+              <a:t>” - </a:t>
+            </a:r>
+            <a:r>
+              <a:rPr lang="en-GB" dirty="0">
+                <a:hlinkClick r:id="rId2"/>
+              </a:rPr>
+              <a:t>https://www.youtube.com/watch?v=bBC-nXj3Ng4</a:t>
+            </a:r>
+            <a:endParaRPr lang="en-GB" dirty="0"/>
+          </a:p>
+          <a:p>
+            <a:r>
+              <a:rPr lang="en-GB" dirty="0"/>
+              <a:t>Somewhere to view the current latest block - https://blockexplorer.com/</a:t>
+            </a:r>
+          </a:p>
           <a:p>
             <a:endParaRPr lang="en-GB" dirty="0"/>
           </a:p>
@@ -4564,7 +4520,7 @@
     </p:spTree>
     <p:extLst>
       <p:ext uri="{BB962C8B-B14F-4D97-AF65-F5344CB8AC3E}">
-        <p14:creationId xmlns:p14="http://schemas.microsoft.com/office/powerpoint/2010/main" val="1336789210"/>
+        <p14:creationId xmlns:p14="http://schemas.microsoft.com/office/powerpoint/2010/main" val="2043931488"/>
       </p:ext>
     </p:extLst>
   </p:cSld>

</xml_diff>